<commit_message>
delete empty silde ( suposed for idk gif )
</commit_message>
<xml_diff>
--- a/Compilation.pptx
+++ b/Compilation.pptx
@@ -7,22 +7,21 @@
   <p:sldIdLst>
     <p:sldId id="256" r:id="rId2"/>
     <p:sldId id="257" r:id="rId3"/>
-    <p:sldId id="273" r:id="rId4"/>
-    <p:sldId id="270" r:id="rId5"/>
-    <p:sldId id="272" r:id="rId6"/>
-    <p:sldId id="271" r:id="rId7"/>
-    <p:sldId id="258" r:id="rId8"/>
-    <p:sldId id="259" r:id="rId9"/>
-    <p:sldId id="260" r:id="rId10"/>
-    <p:sldId id="261" r:id="rId11"/>
-    <p:sldId id="262" r:id="rId12"/>
-    <p:sldId id="263" r:id="rId13"/>
-    <p:sldId id="264" r:id="rId14"/>
-    <p:sldId id="265" r:id="rId15"/>
-    <p:sldId id="267" r:id="rId16"/>
-    <p:sldId id="266" r:id="rId17"/>
-    <p:sldId id="268" r:id="rId18"/>
-    <p:sldId id="269" r:id="rId19"/>
+    <p:sldId id="270" r:id="rId4"/>
+    <p:sldId id="272" r:id="rId5"/>
+    <p:sldId id="271" r:id="rId6"/>
+    <p:sldId id="258" r:id="rId7"/>
+    <p:sldId id="259" r:id="rId8"/>
+    <p:sldId id="260" r:id="rId9"/>
+    <p:sldId id="261" r:id="rId10"/>
+    <p:sldId id="262" r:id="rId11"/>
+    <p:sldId id="263" r:id="rId12"/>
+    <p:sldId id="264" r:id="rId13"/>
+    <p:sldId id="265" r:id="rId14"/>
+    <p:sldId id="267" r:id="rId15"/>
+    <p:sldId id="266" r:id="rId16"/>
+    <p:sldId id="268" r:id="rId17"/>
+    <p:sldId id="269" r:id="rId18"/>
   </p:sldIdLst>
   <p:sldSz cx="12192000" cy="6858000"/>
   <p:notesSz cx="6858000" cy="9144000"/>
@@ -123,7 +122,7 @@
   </p:defaultTextStyle>
   <p:extLst>
     <p:ext uri="{EFAFB233-063F-42B5-8137-9DF3F51BA10A}">
-      <p15:sldGuideLst xmlns="" xmlns:p15="http://schemas.microsoft.com/office/powerpoint/2012/main"/>
+      <p15:sldGuideLst xmlns:p15="http://schemas.microsoft.com/office/powerpoint/2012/main" xmlns=""/>
     </p:ext>
   </p:extLst>
 </p:presentation>
@@ -3083,83 +3082,12 @@
           <a:chExt cx="0" cy="0"/>
         </a:xfrm>
       </p:grpSpPr>
-      <p:pic>
-        <p:nvPicPr>
-          <p:cNvPr id="3074" name="Picture 2" descr="E:\project\youcode\compilation code examples\carbon (1).png"/>
-          <p:cNvPicPr>
-            <a:picLocks noChangeAspect="1" noChangeArrowheads="1"/>
-          </p:cNvPicPr>
-          <p:nvPr/>
-        </p:nvPicPr>
-        <p:blipFill>
-          <a:blip r:embed="rId2">
-            <a:extLst>
-              <a:ext uri="{28A0092B-C50C-407E-A947-70E740481C1C}">
-                <a14:useLocalDpi xmlns:a14="http://schemas.microsoft.com/office/drawing/2010/main" val="0"/>
-              </a:ext>
-            </a:extLst>
-          </a:blip>
-          <a:srcRect/>
-          <a:stretch>
-            <a:fillRect/>
-          </a:stretch>
-        </p:blipFill>
-        <p:spPr bwMode="auto">
-          <a:xfrm>
-            <a:off x="4053211" y="241623"/>
-            <a:ext cx="4035630" cy="6374755"/>
-          </a:xfrm>
-          <a:prstGeom prst="rect">
-            <a:avLst/>
-          </a:prstGeom>
-          <a:noFill/>
-          <a:extLst>
-            <a:ext uri="{909E8E84-426E-40DD-AFC4-6F175D3DCCD1}">
-              <a14:hiddenFill xmlns:a14="http://schemas.microsoft.com/office/drawing/2010/main">
-                <a:solidFill>
-                  <a:srgbClr val="FFFFFF"/>
-                </a:solidFill>
-              </a14:hiddenFill>
-            </a:ext>
-          </a:extLst>
-        </p:spPr>
-      </p:pic>
-    </p:spTree>
-    <p:extLst>
-      <p:ext uri="{BB962C8B-B14F-4D97-AF65-F5344CB8AC3E}">
-        <p14:creationId xmlns:p14="http://schemas.microsoft.com/office/powerpoint/2010/main" val="2941267069"/>
-      </p:ext>
-    </p:extLst>
-  </p:cSld>
-  <p:clrMapOvr>
-    <a:masterClrMapping/>
-  </p:clrMapOvr>
-</p:sld>
-</file>
-
-<file path=ppt/slides/slide11.xml><?xml version="1.0" encoding="utf-8"?>
-<p:sld xmlns:a="http://schemas.openxmlformats.org/drawingml/2006/main" xmlns:r="http://schemas.openxmlformats.org/officeDocument/2006/relationships" xmlns:p="http://schemas.openxmlformats.org/presentationml/2006/main">
-  <p:cSld>
-    <p:spTree>
-      <p:nvGrpSpPr>
-        <p:cNvPr id="1" name=""/>
-        <p:cNvGrpSpPr/>
-        <p:nvPr/>
-      </p:nvGrpSpPr>
-      <p:grpSpPr>
-        <a:xfrm>
-          <a:off x="0" y="0"/>
-          <a:ext cx="0" cy="0"/>
-          <a:chOff x="0" y="0"/>
-          <a:chExt cx="0" cy="0"/>
-        </a:xfrm>
-      </p:grpSpPr>
       <p:sp>
         <p:nvSpPr>
           <p:cNvPr id="8" name="ZoneTexte 7">
             <a:extLst>
               <a:ext uri="{FF2B5EF4-FFF2-40B4-BE49-F238E27FC236}">
-                <a16:creationId xmlns="" xmlns:a16="http://schemas.microsoft.com/office/drawing/2014/main" id="{0998BD72-6C6D-4B79-91C5-9F1AE3281044}"/>
+                <a16:creationId xmlns:a16="http://schemas.microsoft.com/office/drawing/2014/main" xmlns="" id="{0998BD72-6C6D-4B79-91C5-9F1AE3281044}"/>
               </a:ext>
             </a:extLst>
           </p:cNvPr>
@@ -3213,7 +3141,7 @@
 </p:sld>
 </file>
 
-<file path=ppt/slides/slide12.xml><?xml version="1.0" encoding="utf-8"?>
+<file path=ppt/slides/slide11.xml><?xml version="1.0" encoding="utf-8"?>
 <p:sld xmlns:a="http://schemas.openxmlformats.org/drawingml/2006/main" xmlns:r="http://schemas.openxmlformats.org/officeDocument/2006/relationships" xmlns:p="http://schemas.openxmlformats.org/presentationml/2006/main">
   <p:cSld>
     <p:spTree>
@@ -3249,7 +3177,7 @@
             <p:cNvPr id="4" name="ZoneTexte 7">
               <a:extLst>
                 <a:ext uri="{FF2B5EF4-FFF2-40B4-BE49-F238E27FC236}">
-                  <a16:creationId xmlns="" xmlns:a16="http://schemas.microsoft.com/office/drawing/2014/main" id="{0998BD72-6C6D-4B79-91C5-9F1AE3281044}"/>
+                  <a16:creationId xmlns:a16="http://schemas.microsoft.com/office/drawing/2014/main" xmlns="" id="{0998BD72-6C6D-4B79-91C5-9F1AE3281044}"/>
                 </a:ext>
               </a:extLst>
             </p:cNvPr>
@@ -3299,7 +3227,7 @@
             <p:cNvPr id="5" name="ZoneTexte 7">
               <a:extLst>
                 <a:ext uri="{FF2B5EF4-FFF2-40B4-BE49-F238E27FC236}">
-                  <a16:creationId xmlns="" xmlns:a16="http://schemas.microsoft.com/office/drawing/2014/main" id="{0998BD72-6C6D-4B79-91C5-9F1AE3281044}"/>
+                  <a16:creationId xmlns:a16="http://schemas.microsoft.com/office/drawing/2014/main" xmlns="" id="{0998BD72-6C6D-4B79-91C5-9F1AE3281044}"/>
                 </a:ext>
               </a:extLst>
             </p:cNvPr>
@@ -3374,7 +3302,7 @@
 </p:sld>
 </file>
 
-<file path=ppt/slides/slide13.xml><?xml version="1.0" encoding="utf-8"?>
+<file path=ppt/slides/slide12.xml><?xml version="1.0" encoding="utf-8"?>
 <p:sld xmlns:a="http://schemas.openxmlformats.org/drawingml/2006/main" xmlns:r="http://schemas.openxmlformats.org/officeDocument/2006/relationships" xmlns:p="http://schemas.openxmlformats.org/presentationml/2006/main">
   <p:cSld>
     <p:spTree>
@@ -3445,7 +3373,7 @@
 </p:sld>
 </file>
 
-<file path=ppt/slides/slide14.xml><?xml version="1.0" encoding="utf-8"?>
+<file path=ppt/slides/slide13.xml><?xml version="1.0" encoding="utf-8"?>
 <p:sld xmlns:a="http://schemas.openxmlformats.org/drawingml/2006/main" xmlns:r="http://schemas.openxmlformats.org/officeDocument/2006/relationships" xmlns:p="http://schemas.openxmlformats.org/presentationml/2006/main">
   <p:cSld>
     <p:spTree>
@@ -3516,7 +3444,7 @@
 </p:sld>
 </file>
 
-<file path=ppt/slides/slide15.xml><?xml version="1.0" encoding="utf-8"?>
+<file path=ppt/slides/slide14.xml><?xml version="1.0" encoding="utf-8"?>
 <p:sld xmlns:a="http://schemas.openxmlformats.org/drawingml/2006/main" xmlns:r="http://schemas.openxmlformats.org/officeDocument/2006/relationships" xmlns:p="http://schemas.openxmlformats.org/presentationml/2006/main">
   <p:cSld>
     <p:spTree>
@@ -3538,7 +3466,7 @@
           <p:cNvPr id="8" name="ZoneTexte 7">
             <a:extLst>
               <a:ext uri="{FF2B5EF4-FFF2-40B4-BE49-F238E27FC236}">
-                <a16:creationId xmlns="" xmlns:a16="http://schemas.microsoft.com/office/drawing/2014/main" id="{0998BD72-6C6D-4B79-91C5-9F1AE3281044}"/>
+                <a16:creationId xmlns:a16="http://schemas.microsoft.com/office/drawing/2014/main" xmlns="" id="{0998BD72-6C6D-4B79-91C5-9F1AE3281044}"/>
               </a:ext>
             </a:extLst>
           </p:cNvPr>
@@ -3592,7 +3520,7 @@
 </p:sld>
 </file>
 
-<file path=ppt/slides/slide16.xml><?xml version="1.0" encoding="utf-8"?>
+<file path=ppt/slides/slide15.xml><?xml version="1.0" encoding="utf-8"?>
 <p:sld xmlns:a="http://schemas.openxmlformats.org/drawingml/2006/main" xmlns:r="http://schemas.openxmlformats.org/officeDocument/2006/relationships" xmlns:p="http://schemas.openxmlformats.org/presentationml/2006/main">
   <p:cSld>
     <p:spTree>
@@ -3628,7 +3556,7 @@
             <p:cNvPr id="4" name="ZoneTexte 7">
               <a:extLst>
                 <a:ext uri="{FF2B5EF4-FFF2-40B4-BE49-F238E27FC236}">
-                  <a16:creationId xmlns="" xmlns:a16="http://schemas.microsoft.com/office/drawing/2014/main" id="{0998BD72-6C6D-4B79-91C5-9F1AE3281044}"/>
+                  <a16:creationId xmlns:a16="http://schemas.microsoft.com/office/drawing/2014/main" xmlns="" id="{0998BD72-6C6D-4B79-91C5-9F1AE3281044}"/>
                 </a:ext>
               </a:extLst>
             </p:cNvPr>
@@ -3678,7 +3606,7 @@
             <p:cNvPr id="5" name="ZoneTexte 7">
               <a:extLst>
                 <a:ext uri="{FF2B5EF4-FFF2-40B4-BE49-F238E27FC236}">
-                  <a16:creationId xmlns="" xmlns:a16="http://schemas.microsoft.com/office/drawing/2014/main" id="{0998BD72-6C6D-4B79-91C5-9F1AE3281044}"/>
+                  <a16:creationId xmlns:a16="http://schemas.microsoft.com/office/drawing/2014/main" xmlns="" id="{0998BD72-6C6D-4B79-91C5-9F1AE3281044}"/>
                 </a:ext>
               </a:extLst>
             </p:cNvPr>
@@ -3763,7 +3691,7 @@
 </p:sld>
 </file>
 
-<file path=ppt/slides/slide17.xml><?xml version="1.0" encoding="utf-8"?>
+<file path=ppt/slides/slide16.xml><?xml version="1.0" encoding="utf-8"?>
 <p:sld xmlns:a="http://schemas.openxmlformats.org/drawingml/2006/main" xmlns:r="http://schemas.openxmlformats.org/officeDocument/2006/relationships" xmlns:p="http://schemas.openxmlformats.org/presentationml/2006/main">
   <p:cSld>
     <p:spTree>
@@ -3785,7 +3713,7 @@
           <p:cNvPr id="8" name="ZoneTexte 7">
             <a:extLst>
               <a:ext uri="{FF2B5EF4-FFF2-40B4-BE49-F238E27FC236}">
-                <a16:creationId xmlns="" xmlns:a16="http://schemas.microsoft.com/office/drawing/2014/main" id="{0998BD72-6C6D-4B79-91C5-9F1AE3281044}"/>
+                <a16:creationId xmlns:a16="http://schemas.microsoft.com/office/drawing/2014/main" xmlns="" id="{0998BD72-6C6D-4B79-91C5-9F1AE3281044}"/>
               </a:ext>
             </a:extLst>
           </p:cNvPr>
@@ -3839,7 +3767,7 @@
 </p:sld>
 </file>
 
-<file path=ppt/slides/slide18.xml><?xml version="1.0" encoding="utf-8"?>
+<file path=ppt/slides/slide17.xml><?xml version="1.0" encoding="utf-8"?>
 <p:sld xmlns:a="http://schemas.openxmlformats.org/drawingml/2006/main" xmlns:r="http://schemas.openxmlformats.org/officeDocument/2006/relationships" xmlns:p="http://schemas.openxmlformats.org/presentationml/2006/main">
   <p:cSld>
     <p:spTree>
@@ -3875,7 +3803,7 @@
             <p:cNvPr id="4" name="ZoneTexte 7">
               <a:extLst>
                 <a:ext uri="{FF2B5EF4-FFF2-40B4-BE49-F238E27FC236}">
-                  <a16:creationId xmlns="" xmlns:a16="http://schemas.microsoft.com/office/drawing/2014/main" id="{0998BD72-6C6D-4B79-91C5-9F1AE3281044}"/>
+                  <a16:creationId xmlns:a16="http://schemas.microsoft.com/office/drawing/2014/main" xmlns="" id="{0998BD72-6C6D-4B79-91C5-9F1AE3281044}"/>
                 </a:ext>
               </a:extLst>
             </p:cNvPr>
@@ -3925,7 +3853,7 @@
             <p:cNvPr id="5" name="ZoneTexte 7">
               <a:extLst>
                 <a:ext uri="{FF2B5EF4-FFF2-40B4-BE49-F238E27FC236}">
-                  <a16:creationId xmlns="" xmlns:a16="http://schemas.microsoft.com/office/drawing/2014/main" id="{0998BD72-6C6D-4B79-91C5-9F1AE3281044}"/>
+                  <a16:creationId xmlns:a16="http://schemas.microsoft.com/office/drawing/2014/main" xmlns="" id="{0998BD72-6C6D-4B79-91C5-9F1AE3281044}"/>
                 </a:ext>
               </a:extLst>
             </p:cNvPr>
@@ -4032,7 +3960,7 @@
           <p:cNvPr id="8" name="ZoneTexte 7">
             <a:extLst>
               <a:ext uri="{FF2B5EF4-FFF2-40B4-BE49-F238E27FC236}">
-                <a16:creationId xmlns="" xmlns:a16="http://schemas.microsoft.com/office/drawing/2014/main" id="{0998BD72-6C6D-4B79-91C5-9F1AE3281044}"/>
+                <a16:creationId xmlns:a16="http://schemas.microsoft.com/office/drawing/2014/main" xmlns="" id="{0998BD72-6C6D-4B79-91C5-9F1AE3281044}"/>
               </a:ext>
             </a:extLst>
           </p:cNvPr>
@@ -4218,10 +4146,57 @@
           <a:chExt cx="0" cy="0"/>
         </a:xfrm>
       </p:grpSpPr>
+      <p:sp>
+        <p:nvSpPr>
+          <p:cNvPr id="3" name="Sous-titre 2"/>
+          <p:cNvSpPr>
+            <a:spLocks noGrp="1"/>
+          </p:cNvSpPr>
+          <p:nvPr>
+            <p:ph type="subTitle" idx="1"/>
+          </p:nvPr>
+        </p:nvSpPr>
+        <p:spPr>
+          <a:xfrm>
+            <a:off x="621175" y="2827117"/>
+            <a:ext cx="10949651" cy="1203767"/>
+          </a:xfrm>
+        </p:spPr>
+        <p:txBody>
+          <a:bodyPr vert="horz" lIns="91440" tIns="45720" rIns="91440" bIns="45720" rtlCol="0" anchor="t">
+            <a:noAutofit/>
+          </a:bodyPr>
+          <a:lstStyle/>
+          <a:p>
+            <a:pPr algn="l"/>
+            <a:r>
+              <a:rPr lang="en-US" sz="2800" b="1" dirty="0" smtClean="0">
+                <a:cs typeface="Calibri"/>
+              </a:rPr>
+              <a:t>Compilation is the process of turning human readable code ( A programing language e.g. C ) into binary code that the computer can understand using a </a:t>
+            </a:r>
+            <a:r>
+              <a:rPr lang="en-US" sz="2800" b="1" dirty="0">
+                <a:cs typeface="Calibri"/>
+              </a:rPr>
+              <a:t>special program called Compiler</a:t>
+            </a:r>
+            <a:endParaRPr lang="en-US" sz="2800" b="1" dirty="0" smtClean="0">
+              <a:cs typeface="Calibri"/>
+            </a:endParaRPr>
+          </a:p>
+          <a:p>
+            <a:pPr algn="l"/>
+            <a:endParaRPr lang="en-US" sz="2800" b="1" dirty="0">
+              <a:cs typeface="Calibri"/>
+            </a:endParaRPr>
+          </a:p>
+        </p:txBody>
+      </p:sp>
     </p:spTree>
     <p:extLst>
       <p:ext uri="{BB962C8B-B14F-4D97-AF65-F5344CB8AC3E}">
-        <p14:creationId xmlns:p14="http://schemas.microsoft.com/office/powerpoint/2010/main" val="815857007"/>
+        <p14:creationId xmlns:p14="http://schemas.microsoft.com/office/powerpoint/2010/main" val="2873541037"/>
       </p:ext>
     </p:extLst>
   </p:cSld>
@@ -4267,8 +4242,8 @@
         </p:nvSpPr>
         <p:spPr>
           <a:xfrm>
-            <a:off x="621175" y="2827117"/>
-            <a:ext cx="10949651" cy="1203767"/>
+            <a:off x="1088020" y="2967460"/>
+            <a:ext cx="10015960" cy="923080"/>
           </a:xfrm>
         </p:spPr>
         <p:txBody>
@@ -4282,32 +4257,206 @@
               <a:rPr lang="en-US" sz="2800" b="1" dirty="0" smtClean="0">
                 <a:cs typeface="Calibri"/>
               </a:rPr>
-              <a:t>Compilation is the process of </a:t>
-            </a:r>
+              <a:t>Compiler is a program that take our source code as an input and translate it into a machine code</a:t>
+            </a:r>
+            <a:endParaRPr lang="en-US" sz="2800" b="1" dirty="0">
+              <a:cs typeface="Calibri"/>
+            </a:endParaRPr>
+          </a:p>
+        </p:txBody>
+      </p:sp>
+      <p:sp>
+        <p:nvSpPr>
+          <p:cNvPr id="5" name="Sous-titre 2"/>
+          <p:cNvSpPr txBox="1">
+            <a:spLocks/>
+          </p:cNvSpPr>
+          <p:nvPr/>
+        </p:nvSpPr>
+        <p:spPr>
+          <a:xfrm>
+            <a:off x="1159397" y="1904518"/>
+            <a:ext cx="10015960" cy="461540"/>
+          </a:xfrm>
+          <a:prstGeom prst="rect">
+            <a:avLst/>
+          </a:prstGeom>
+        </p:spPr>
+        <p:txBody>
+          <a:bodyPr vert="horz" lIns="91440" tIns="45720" rIns="91440" bIns="45720" rtlCol="0" anchor="t">
+            <a:noAutofit/>
+          </a:bodyPr>
+          <a:lstStyle>
+            <a:lvl1pPr marL="0" indent="0" algn="ctr" defTabSz="914400" rtl="0" eaLnBrk="1" latinLnBrk="0" hangingPunct="1">
+              <a:lnSpc>
+                <a:spcPct val="90000"/>
+              </a:lnSpc>
+              <a:spcBef>
+                <a:spcPts val="1000"/>
+              </a:spcBef>
+              <a:buFont typeface="Arial" panose="020B0604020202020204" pitchFamily="34" charset="0"/>
+              <a:buNone/>
+              <a:defRPr sz="2400" kern="1200">
+                <a:solidFill>
+                  <a:schemeClr val="tx1"/>
+                </a:solidFill>
+                <a:latin typeface="+mn-lt"/>
+                <a:ea typeface="+mn-ea"/>
+                <a:cs typeface="+mn-cs"/>
+              </a:defRPr>
+            </a:lvl1pPr>
+            <a:lvl2pPr marL="457200" indent="0" algn="ctr" defTabSz="914400" rtl="0" eaLnBrk="1" latinLnBrk="0" hangingPunct="1">
+              <a:lnSpc>
+                <a:spcPct val="90000"/>
+              </a:lnSpc>
+              <a:spcBef>
+                <a:spcPts val="500"/>
+              </a:spcBef>
+              <a:buFont typeface="Arial" panose="020B0604020202020204" pitchFamily="34" charset="0"/>
+              <a:buNone/>
+              <a:defRPr sz="2000" kern="1200">
+                <a:solidFill>
+                  <a:schemeClr val="tx1"/>
+                </a:solidFill>
+                <a:latin typeface="+mn-lt"/>
+                <a:ea typeface="+mn-ea"/>
+                <a:cs typeface="+mn-cs"/>
+              </a:defRPr>
+            </a:lvl2pPr>
+            <a:lvl3pPr marL="914400" indent="0" algn="ctr" defTabSz="914400" rtl="0" eaLnBrk="1" latinLnBrk="0" hangingPunct="1">
+              <a:lnSpc>
+                <a:spcPct val="90000"/>
+              </a:lnSpc>
+              <a:spcBef>
+                <a:spcPts val="500"/>
+              </a:spcBef>
+              <a:buFont typeface="Arial" panose="020B0604020202020204" pitchFamily="34" charset="0"/>
+              <a:buNone/>
+              <a:defRPr sz="1800" kern="1200">
+                <a:solidFill>
+                  <a:schemeClr val="tx1"/>
+                </a:solidFill>
+                <a:latin typeface="+mn-lt"/>
+                <a:ea typeface="+mn-ea"/>
+                <a:cs typeface="+mn-cs"/>
+              </a:defRPr>
+            </a:lvl3pPr>
+            <a:lvl4pPr marL="1371600" indent="0" algn="ctr" defTabSz="914400" rtl="0" eaLnBrk="1" latinLnBrk="0" hangingPunct="1">
+              <a:lnSpc>
+                <a:spcPct val="90000"/>
+              </a:lnSpc>
+              <a:spcBef>
+                <a:spcPts val="500"/>
+              </a:spcBef>
+              <a:buFont typeface="Arial" panose="020B0604020202020204" pitchFamily="34" charset="0"/>
+              <a:buNone/>
+              <a:defRPr sz="1600" kern="1200">
+                <a:solidFill>
+                  <a:schemeClr val="tx1"/>
+                </a:solidFill>
+                <a:latin typeface="+mn-lt"/>
+                <a:ea typeface="+mn-ea"/>
+                <a:cs typeface="+mn-cs"/>
+              </a:defRPr>
+            </a:lvl4pPr>
+            <a:lvl5pPr marL="1828800" indent="0" algn="ctr" defTabSz="914400" rtl="0" eaLnBrk="1" latinLnBrk="0" hangingPunct="1">
+              <a:lnSpc>
+                <a:spcPct val="90000"/>
+              </a:lnSpc>
+              <a:spcBef>
+                <a:spcPts val="500"/>
+              </a:spcBef>
+              <a:buFont typeface="Arial" panose="020B0604020202020204" pitchFamily="34" charset="0"/>
+              <a:buNone/>
+              <a:defRPr sz="1600" kern="1200">
+                <a:solidFill>
+                  <a:schemeClr val="tx1"/>
+                </a:solidFill>
+                <a:latin typeface="+mn-lt"/>
+                <a:ea typeface="+mn-ea"/>
+                <a:cs typeface="+mn-cs"/>
+              </a:defRPr>
+            </a:lvl5pPr>
+            <a:lvl6pPr marL="2286000" indent="0" algn="ctr" defTabSz="914400" rtl="0" eaLnBrk="1" latinLnBrk="0" hangingPunct="1">
+              <a:lnSpc>
+                <a:spcPct val="90000"/>
+              </a:lnSpc>
+              <a:spcBef>
+                <a:spcPts val="500"/>
+              </a:spcBef>
+              <a:buFont typeface="Arial" panose="020B0604020202020204" pitchFamily="34" charset="0"/>
+              <a:buNone/>
+              <a:defRPr sz="1600" kern="1200">
+                <a:solidFill>
+                  <a:schemeClr val="tx1"/>
+                </a:solidFill>
+                <a:latin typeface="+mn-lt"/>
+                <a:ea typeface="+mn-ea"/>
+                <a:cs typeface="+mn-cs"/>
+              </a:defRPr>
+            </a:lvl6pPr>
+            <a:lvl7pPr marL="2743200" indent="0" algn="ctr" defTabSz="914400" rtl="0" eaLnBrk="1" latinLnBrk="0" hangingPunct="1">
+              <a:lnSpc>
+                <a:spcPct val="90000"/>
+              </a:lnSpc>
+              <a:spcBef>
+                <a:spcPts val="500"/>
+              </a:spcBef>
+              <a:buFont typeface="Arial" panose="020B0604020202020204" pitchFamily="34" charset="0"/>
+              <a:buNone/>
+              <a:defRPr sz="1600" kern="1200">
+                <a:solidFill>
+                  <a:schemeClr val="tx1"/>
+                </a:solidFill>
+                <a:latin typeface="+mn-lt"/>
+                <a:ea typeface="+mn-ea"/>
+                <a:cs typeface="+mn-cs"/>
+              </a:defRPr>
+            </a:lvl7pPr>
+            <a:lvl8pPr marL="3200400" indent="0" algn="ctr" defTabSz="914400" rtl="0" eaLnBrk="1" latinLnBrk="0" hangingPunct="1">
+              <a:lnSpc>
+                <a:spcPct val="90000"/>
+              </a:lnSpc>
+              <a:spcBef>
+                <a:spcPts val="500"/>
+              </a:spcBef>
+              <a:buFont typeface="Arial" panose="020B0604020202020204" pitchFamily="34" charset="0"/>
+              <a:buNone/>
+              <a:defRPr sz="1600" kern="1200">
+                <a:solidFill>
+                  <a:schemeClr val="tx1"/>
+                </a:solidFill>
+                <a:latin typeface="+mn-lt"/>
+                <a:ea typeface="+mn-ea"/>
+                <a:cs typeface="+mn-cs"/>
+              </a:defRPr>
+            </a:lvl8pPr>
+            <a:lvl9pPr marL="3657600" indent="0" algn="ctr" defTabSz="914400" rtl="0" eaLnBrk="1" latinLnBrk="0" hangingPunct="1">
+              <a:lnSpc>
+                <a:spcPct val="90000"/>
+              </a:lnSpc>
+              <a:spcBef>
+                <a:spcPts val="500"/>
+              </a:spcBef>
+              <a:buFont typeface="Arial" panose="020B0604020202020204" pitchFamily="34" charset="0"/>
+              <a:buNone/>
+              <a:defRPr sz="1600" kern="1200">
+                <a:solidFill>
+                  <a:schemeClr val="tx1"/>
+                </a:solidFill>
+                <a:latin typeface="+mn-lt"/>
+                <a:ea typeface="+mn-ea"/>
+                <a:cs typeface="+mn-cs"/>
+              </a:defRPr>
+            </a:lvl9pPr>
+          </a:lstStyle>
+          <a:p>
             <a:r>
               <a:rPr lang="en-US" sz="2800" b="1" dirty="0" smtClean="0">
                 <a:cs typeface="Calibri"/>
               </a:rPr>
-              <a:t>turning human </a:t>
-            </a:r>
-            <a:r>
-              <a:rPr lang="en-US" sz="2800" b="1" dirty="0" smtClean="0">
-                <a:cs typeface="Calibri"/>
-              </a:rPr>
-              <a:t>readable code ( A programing language e.g. C ) into binary code that the computer can understand using a </a:t>
-            </a:r>
-            <a:r>
-              <a:rPr lang="en-US" sz="2800" b="1" dirty="0">
-                <a:cs typeface="Calibri"/>
-              </a:rPr>
-              <a:t>special program called Compiler</a:t>
-            </a:r>
-            <a:endParaRPr lang="en-US" sz="2800" b="1" dirty="0" smtClean="0">
-              <a:cs typeface="Calibri"/>
-            </a:endParaRPr>
-          </a:p>
-          <a:p>
-            <a:pPr algn="l"/>
+              <a:t>What’s a Compiler?</a:t>
+            </a:r>
             <a:endParaRPr lang="en-US" sz="2800" b="1" dirty="0">
               <a:cs typeface="Calibri"/>
             </a:endParaRPr>
@@ -4317,7 +4466,7 @@
     </p:spTree>
     <p:extLst>
       <p:ext uri="{BB962C8B-B14F-4D97-AF65-F5344CB8AC3E}">
-        <p14:creationId xmlns:p14="http://schemas.microsoft.com/office/powerpoint/2010/main" val="2873541037"/>
+        <p14:creationId xmlns:p14="http://schemas.microsoft.com/office/powerpoint/2010/main" val="1936249921"/>
       </p:ext>
     </p:extLst>
   </p:cSld>
@@ -4353,280 +4502,10 @@
       </p:grpSpPr>
       <p:sp>
         <p:nvSpPr>
-          <p:cNvPr id="3" name="Sous-titre 2"/>
-          <p:cNvSpPr>
-            <a:spLocks noGrp="1"/>
-          </p:cNvSpPr>
-          <p:nvPr>
-            <p:ph type="subTitle" idx="1"/>
-          </p:nvPr>
-        </p:nvSpPr>
-        <p:spPr>
-          <a:xfrm>
-            <a:off x="1088020" y="2967460"/>
-            <a:ext cx="10015960" cy="923080"/>
-          </a:xfrm>
-        </p:spPr>
-        <p:txBody>
-          <a:bodyPr vert="horz" lIns="91440" tIns="45720" rIns="91440" bIns="45720" rtlCol="0" anchor="t">
-            <a:noAutofit/>
-          </a:bodyPr>
-          <a:lstStyle/>
-          <a:p>
-            <a:pPr algn="l"/>
-            <a:r>
-              <a:rPr lang="en-US" sz="2800" b="1" dirty="0" smtClean="0">
-                <a:cs typeface="Calibri"/>
-              </a:rPr>
-              <a:t>Compiler is a program that take our source code as an input and translate it into a machine code</a:t>
-            </a:r>
-            <a:endParaRPr lang="en-US" sz="2800" b="1" dirty="0">
-              <a:cs typeface="Calibri"/>
-            </a:endParaRPr>
-          </a:p>
-        </p:txBody>
-      </p:sp>
-      <p:sp>
-        <p:nvSpPr>
-          <p:cNvPr id="5" name="Sous-titre 2"/>
-          <p:cNvSpPr txBox="1">
-            <a:spLocks/>
-          </p:cNvSpPr>
-          <p:nvPr/>
-        </p:nvSpPr>
-        <p:spPr>
-          <a:xfrm>
-            <a:off x="1159397" y="1904518"/>
-            <a:ext cx="10015960" cy="461540"/>
-          </a:xfrm>
-          <a:prstGeom prst="rect">
-            <a:avLst/>
-          </a:prstGeom>
-        </p:spPr>
-        <p:txBody>
-          <a:bodyPr vert="horz" lIns="91440" tIns="45720" rIns="91440" bIns="45720" rtlCol="0" anchor="t">
-            <a:noAutofit/>
-          </a:bodyPr>
-          <a:lstStyle>
-            <a:lvl1pPr marL="0" indent="0" algn="ctr" defTabSz="914400" rtl="0" eaLnBrk="1" latinLnBrk="0" hangingPunct="1">
-              <a:lnSpc>
-                <a:spcPct val="90000"/>
-              </a:lnSpc>
-              <a:spcBef>
-                <a:spcPts val="1000"/>
-              </a:spcBef>
-              <a:buFont typeface="Arial" panose="020B0604020202020204" pitchFamily="34" charset="0"/>
-              <a:buNone/>
-              <a:defRPr sz="2400" kern="1200">
-                <a:solidFill>
-                  <a:schemeClr val="tx1"/>
-                </a:solidFill>
-                <a:latin typeface="+mn-lt"/>
-                <a:ea typeface="+mn-ea"/>
-                <a:cs typeface="+mn-cs"/>
-              </a:defRPr>
-            </a:lvl1pPr>
-            <a:lvl2pPr marL="457200" indent="0" algn="ctr" defTabSz="914400" rtl="0" eaLnBrk="1" latinLnBrk="0" hangingPunct="1">
-              <a:lnSpc>
-                <a:spcPct val="90000"/>
-              </a:lnSpc>
-              <a:spcBef>
-                <a:spcPts val="500"/>
-              </a:spcBef>
-              <a:buFont typeface="Arial" panose="020B0604020202020204" pitchFamily="34" charset="0"/>
-              <a:buNone/>
-              <a:defRPr sz="2000" kern="1200">
-                <a:solidFill>
-                  <a:schemeClr val="tx1"/>
-                </a:solidFill>
-                <a:latin typeface="+mn-lt"/>
-                <a:ea typeface="+mn-ea"/>
-                <a:cs typeface="+mn-cs"/>
-              </a:defRPr>
-            </a:lvl2pPr>
-            <a:lvl3pPr marL="914400" indent="0" algn="ctr" defTabSz="914400" rtl="0" eaLnBrk="1" latinLnBrk="0" hangingPunct="1">
-              <a:lnSpc>
-                <a:spcPct val="90000"/>
-              </a:lnSpc>
-              <a:spcBef>
-                <a:spcPts val="500"/>
-              </a:spcBef>
-              <a:buFont typeface="Arial" panose="020B0604020202020204" pitchFamily="34" charset="0"/>
-              <a:buNone/>
-              <a:defRPr sz="1800" kern="1200">
-                <a:solidFill>
-                  <a:schemeClr val="tx1"/>
-                </a:solidFill>
-                <a:latin typeface="+mn-lt"/>
-                <a:ea typeface="+mn-ea"/>
-                <a:cs typeface="+mn-cs"/>
-              </a:defRPr>
-            </a:lvl3pPr>
-            <a:lvl4pPr marL="1371600" indent="0" algn="ctr" defTabSz="914400" rtl="0" eaLnBrk="1" latinLnBrk="0" hangingPunct="1">
-              <a:lnSpc>
-                <a:spcPct val="90000"/>
-              </a:lnSpc>
-              <a:spcBef>
-                <a:spcPts val="500"/>
-              </a:spcBef>
-              <a:buFont typeface="Arial" panose="020B0604020202020204" pitchFamily="34" charset="0"/>
-              <a:buNone/>
-              <a:defRPr sz="1600" kern="1200">
-                <a:solidFill>
-                  <a:schemeClr val="tx1"/>
-                </a:solidFill>
-                <a:latin typeface="+mn-lt"/>
-                <a:ea typeface="+mn-ea"/>
-                <a:cs typeface="+mn-cs"/>
-              </a:defRPr>
-            </a:lvl4pPr>
-            <a:lvl5pPr marL="1828800" indent="0" algn="ctr" defTabSz="914400" rtl="0" eaLnBrk="1" latinLnBrk="0" hangingPunct="1">
-              <a:lnSpc>
-                <a:spcPct val="90000"/>
-              </a:lnSpc>
-              <a:spcBef>
-                <a:spcPts val="500"/>
-              </a:spcBef>
-              <a:buFont typeface="Arial" panose="020B0604020202020204" pitchFamily="34" charset="0"/>
-              <a:buNone/>
-              <a:defRPr sz="1600" kern="1200">
-                <a:solidFill>
-                  <a:schemeClr val="tx1"/>
-                </a:solidFill>
-                <a:latin typeface="+mn-lt"/>
-                <a:ea typeface="+mn-ea"/>
-                <a:cs typeface="+mn-cs"/>
-              </a:defRPr>
-            </a:lvl5pPr>
-            <a:lvl6pPr marL="2286000" indent="0" algn="ctr" defTabSz="914400" rtl="0" eaLnBrk="1" latinLnBrk="0" hangingPunct="1">
-              <a:lnSpc>
-                <a:spcPct val="90000"/>
-              </a:lnSpc>
-              <a:spcBef>
-                <a:spcPts val="500"/>
-              </a:spcBef>
-              <a:buFont typeface="Arial" panose="020B0604020202020204" pitchFamily="34" charset="0"/>
-              <a:buNone/>
-              <a:defRPr sz="1600" kern="1200">
-                <a:solidFill>
-                  <a:schemeClr val="tx1"/>
-                </a:solidFill>
-                <a:latin typeface="+mn-lt"/>
-                <a:ea typeface="+mn-ea"/>
-                <a:cs typeface="+mn-cs"/>
-              </a:defRPr>
-            </a:lvl6pPr>
-            <a:lvl7pPr marL="2743200" indent="0" algn="ctr" defTabSz="914400" rtl="0" eaLnBrk="1" latinLnBrk="0" hangingPunct="1">
-              <a:lnSpc>
-                <a:spcPct val="90000"/>
-              </a:lnSpc>
-              <a:spcBef>
-                <a:spcPts val="500"/>
-              </a:spcBef>
-              <a:buFont typeface="Arial" panose="020B0604020202020204" pitchFamily="34" charset="0"/>
-              <a:buNone/>
-              <a:defRPr sz="1600" kern="1200">
-                <a:solidFill>
-                  <a:schemeClr val="tx1"/>
-                </a:solidFill>
-                <a:latin typeface="+mn-lt"/>
-                <a:ea typeface="+mn-ea"/>
-                <a:cs typeface="+mn-cs"/>
-              </a:defRPr>
-            </a:lvl7pPr>
-            <a:lvl8pPr marL="3200400" indent="0" algn="ctr" defTabSz="914400" rtl="0" eaLnBrk="1" latinLnBrk="0" hangingPunct="1">
-              <a:lnSpc>
-                <a:spcPct val="90000"/>
-              </a:lnSpc>
-              <a:spcBef>
-                <a:spcPts val="500"/>
-              </a:spcBef>
-              <a:buFont typeface="Arial" panose="020B0604020202020204" pitchFamily="34" charset="0"/>
-              <a:buNone/>
-              <a:defRPr sz="1600" kern="1200">
-                <a:solidFill>
-                  <a:schemeClr val="tx1"/>
-                </a:solidFill>
-                <a:latin typeface="+mn-lt"/>
-                <a:ea typeface="+mn-ea"/>
-                <a:cs typeface="+mn-cs"/>
-              </a:defRPr>
-            </a:lvl8pPr>
-            <a:lvl9pPr marL="3657600" indent="0" algn="ctr" defTabSz="914400" rtl="0" eaLnBrk="1" latinLnBrk="0" hangingPunct="1">
-              <a:lnSpc>
-                <a:spcPct val="90000"/>
-              </a:lnSpc>
-              <a:spcBef>
-                <a:spcPts val="500"/>
-              </a:spcBef>
-              <a:buFont typeface="Arial" panose="020B0604020202020204" pitchFamily="34" charset="0"/>
-              <a:buNone/>
-              <a:defRPr sz="1600" kern="1200">
-                <a:solidFill>
-                  <a:schemeClr val="tx1"/>
-                </a:solidFill>
-                <a:latin typeface="+mn-lt"/>
-                <a:ea typeface="+mn-ea"/>
-                <a:cs typeface="+mn-cs"/>
-              </a:defRPr>
-            </a:lvl9pPr>
-          </a:lstStyle>
-          <a:p>
-            <a:r>
-              <a:rPr lang="en-US" sz="2800" b="1" dirty="0" smtClean="0">
-                <a:cs typeface="Calibri"/>
-              </a:rPr>
-              <a:t>What’s a Compiler?</a:t>
-            </a:r>
-            <a:endParaRPr lang="en-US" sz="2800" b="1" dirty="0">
-              <a:cs typeface="Calibri"/>
-            </a:endParaRPr>
-          </a:p>
-        </p:txBody>
-      </p:sp>
-    </p:spTree>
-    <p:extLst>
-      <p:ext uri="{BB962C8B-B14F-4D97-AF65-F5344CB8AC3E}">
-        <p14:creationId xmlns:p14="http://schemas.microsoft.com/office/powerpoint/2010/main" val="1936249921"/>
-      </p:ext>
-    </p:extLst>
-  </p:cSld>
-  <p:clrMapOvr>
-    <a:masterClrMapping/>
-  </p:clrMapOvr>
-  <p:timing>
-    <p:tnLst>
-      <p:par>
-        <p:cTn id="1" dur="indefinite" restart="never" nodeType="tmRoot"/>
-      </p:par>
-    </p:tnLst>
-  </p:timing>
-</p:sld>
-</file>
-
-<file path=ppt/slides/slide6.xml><?xml version="1.0" encoding="utf-8"?>
-<p:sld xmlns:a="http://schemas.openxmlformats.org/drawingml/2006/main" xmlns:r="http://schemas.openxmlformats.org/officeDocument/2006/relationships" xmlns:p="http://schemas.openxmlformats.org/presentationml/2006/main">
-  <p:cSld>
-    <p:spTree>
-      <p:nvGrpSpPr>
-        <p:cNvPr id="1" name=""/>
-        <p:cNvGrpSpPr/>
-        <p:nvPr/>
-      </p:nvGrpSpPr>
-      <p:grpSpPr>
-        <a:xfrm>
-          <a:off x="0" y="0"/>
-          <a:ext cx="0" cy="0"/>
-          <a:chOff x="0" y="0"/>
-          <a:chExt cx="0" cy="0"/>
-        </a:xfrm>
-      </p:grpSpPr>
-      <p:sp>
-        <p:nvSpPr>
           <p:cNvPr id="8" name="ZoneTexte 7">
             <a:extLst>
               <a:ext uri="{FF2B5EF4-FFF2-40B4-BE49-F238E27FC236}">
-                <a16:creationId xmlns="" xmlns:a16="http://schemas.microsoft.com/office/drawing/2014/main" id="{0998BD72-6C6D-4B79-91C5-9F1AE3281044}"/>
+                <a16:creationId xmlns:a16="http://schemas.microsoft.com/office/drawing/2014/main" xmlns="" id="{0998BD72-6C6D-4B79-91C5-9F1AE3281044}"/>
               </a:ext>
             </a:extLst>
           </p:cNvPr>
@@ -4657,13 +4536,7 @@
               <a:rPr lang="en-US" sz="3200" b="1" dirty="0" smtClean="0">
                 <a:cs typeface="Calibri"/>
               </a:rPr>
-              <a:t>D</a:t>
-            </a:r>
-            <a:r>
-              <a:rPr lang="en-US" sz="3200" b="1" dirty="0" smtClean="0">
-                <a:cs typeface="Calibri"/>
-              </a:rPr>
-              <a:t>eferens between interpreters and compilers:</a:t>
+              <a:t>Deferens between interpreters and compilers:</a:t>
             </a:r>
           </a:p>
         </p:txBody>
@@ -4947,7 +4820,7 @@
 </p:sld>
 </file>
 
-<file path=ppt/slides/slide7.xml><?xml version="1.0" encoding="utf-8"?>
+<file path=ppt/slides/slide6.xml><?xml version="1.0" encoding="utf-8"?>
 <p:sld xmlns:a="http://schemas.openxmlformats.org/drawingml/2006/main" xmlns:r="http://schemas.openxmlformats.org/officeDocument/2006/relationships" xmlns:p="http://schemas.openxmlformats.org/presentationml/2006/main">
   <p:cSld>
     <p:spTree>
@@ -4969,7 +4842,7 @@
           <p:cNvPr id="8" name="ZoneTexte 7">
             <a:extLst>
               <a:ext uri="{FF2B5EF4-FFF2-40B4-BE49-F238E27FC236}">
-                <a16:creationId xmlns="" xmlns:a16="http://schemas.microsoft.com/office/drawing/2014/main" id="{0998BD72-6C6D-4B79-91C5-9F1AE3281044}"/>
+                <a16:creationId xmlns:a16="http://schemas.microsoft.com/office/drawing/2014/main" xmlns="" id="{0998BD72-6C6D-4B79-91C5-9F1AE3281044}"/>
               </a:ext>
             </a:extLst>
           </p:cNvPr>
@@ -5029,7 +4902,7 @@
 </p:sld>
 </file>
 
-<file path=ppt/slides/slide8.xml><?xml version="1.0" encoding="utf-8"?>
+<file path=ppt/slides/slide7.xml><?xml version="1.0" encoding="utf-8"?>
 <p:sld xmlns:a="http://schemas.openxmlformats.org/drawingml/2006/main" xmlns:r="http://schemas.openxmlformats.org/officeDocument/2006/relationships" xmlns:p="http://schemas.openxmlformats.org/presentationml/2006/main">
   <p:cSld>
     <p:spTree>
@@ -5065,7 +4938,7 @@
             <p:cNvPr id="8" name="ZoneTexte 7">
               <a:extLst>
                 <a:ext uri="{FF2B5EF4-FFF2-40B4-BE49-F238E27FC236}">
-                  <a16:creationId xmlns="" xmlns:a16="http://schemas.microsoft.com/office/drawing/2014/main" id="{0998BD72-6C6D-4B79-91C5-9F1AE3281044}"/>
+                  <a16:creationId xmlns:a16="http://schemas.microsoft.com/office/drawing/2014/main" xmlns="" id="{0998BD72-6C6D-4B79-91C5-9F1AE3281044}"/>
                 </a:ext>
               </a:extLst>
             </p:cNvPr>
@@ -5134,7 +5007,7 @@
             <p:cNvPr id="4" name="ZoneTexte 7">
               <a:extLst>
                 <a:ext uri="{FF2B5EF4-FFF2-40B4-BE49-F238E27FC236}">
-                  <a16:creationId xmlns="" xmlns:a16="http://schemas.microsoft.com/office/drawing/2014/main" id="{0998BD72-6C6D-4B79-91C5-9F1AE3281044}"/>
+                  <a16:creationId xmlns:a16="http://schemas.microsoft.com/office/drawing/2014/main" xmlns="" id="{0998BD72-6C6D-4B79-91C5-9F1AE3281044}"/>
                 </a:ext>
               </a:extLst>
             </p:cNvPr>
@@ -5216,7 +5089,7 @@
 </p:sld>
 </file>
 
-<file path=ppt/slides/slide9.xml><?xml version="1.0" encoding="utf-8"?>
+<file path=ppt/slides/slide8.xml><?xml version="1.0" encoding="utf-8"?>
 <p:sld xmlns:a="http://schemas.openxmlformats.org/drawingml/2006/main" xmlns:r="http://schemas.openxmlformats.org/officeDocument/2006/relationships" xmlns:p="http://schemas.openxmlformats.org/presentationml/2006/main">
   <p:cSld>
     <p:spTree>
@@ -5278,6 +5151,77 @@
     <p:extLst>
       <p:ext uri="{BB962C8B-B14F-4D97-AF65-F5344CB8AC3E}">
         <p14:creationId xmlns:p14="http://schemas.microsoft.com/office/powerpoint/2010/main" val="390007119"/>
+      </p:ext>
+    </p:extLst>
+  </p:cSld>
+  <p:clrMapOvr>
+    <a:masterClrMapping/>
+  </p:clrMapOvr>
+</p:sld>
+</file>
+
+<file path=ppt/slides/slide9.xml><?xml version="1.0" encoding="utf-8"?>
+<p:sld xmlns:a="http://schemas.openxmlformats.org/drawingml/2006/main" xmlns:r="http://schemas.openxmlformats.org/officeDocument/2006/relationships" xmlns:p="http://schemas.openxmlformats.org/presentationml/2006/main">
+  <p:cSld>
+    <p:spTree>
+      <p:nvGrpSpPr>
+        <p:cNvPr id="1" name=""/>
+        <p:cNvGrpSpPr/>
+        <p:nvPr/>
+      </p:nvGrpSpPr>
+      <p:grpSpPr>
+        <a:xfrm>
+          <a:off x="0" y="0"/>
+          <a:ext cx="0" cy="0"/>
+          <a:chOff x="0" y="0"/>
+          <a:chExt cx="0" cy="0"/>
+        </a:xfrm>
+      </p:grpSpPr>
+      <p:pic>
+        <p:nvPicPr>
+          <p:cNvPr id="3074" name="Picture 2" descr="E:\project\youcode\compilation code examples\carbon (1).png"/>
+          <p:cNvPicPr>
+            <a:picLocks noChangeAspect="1" noChangeArrowheads="1"/>
+          </p:cNvPicPr>
+          <p:nvPr/>
+        </p:nvPicPr>
+        <p:blipFill>
+          <a:blip r:embed="rId2">
+            <a:extLst>
+              <a:ext uri="{28A0092B-C50C-407E-A947-70E740481C1C}">
+                <a14:useLocalDpi xmlns:a14="http://schemas.microsoft.com/office/drawing/2010/main" val="0"/>
+              </a:ext>
+            </a:extLst>
+          </a:blip>
+          <a:srcRect/>
+          <a:stretch>
+            <a:fillRect/>
+          </a:stretch>
+        </p:blipFill>
+        <p:spPr bwMode="auto">
+          <a:xfrm>
+            <a:off x="4053211" y="241623"/>
+            <a:ext cx="4035630" cy="6374755"/>
+          </a:xfrm>
+          <a:prstGeom prst="rect">
+            <a:avLst/>
+          </a:prstGeom>
+          <a:noFill/>
+          <a:extLst>
+            <a:ext uri="{909E8E84-426E-40DD-AFC4-6F175D3DCCD1}">
+              <a14:hiddenFill xmlns:a14="http://schemas.microsoft.com/office/drawing/2010/main">
+                <a:solidFill>
+                  <a:srgbClr val="FFFFFF"/>
+                </a:solidFill>
+              </a14:hiddenFill>
+            </a:ext>
+          </a:extLst>
+        </p:spPr>
+      </p:pic>
+    </p:spTree>
+    <p:extLst>
+      <p:ext uri="{BB962C8B-B14F-4D97-AF65-F5344CB8AC3E}">
+        <p14:creationId xmlns:p14="http://schemas.microsoft.com/office/powerpoint/2010/main" val="2941267069"/>
       </p:ext>
     </p:extLst>
   </p:cSld>
@@ -5542,7 +5486,7 @@
   <a:extraClrSchemeLst/>
   <a:extLst>
     <a:ext uri="{05A4C25C-085E-4340-85A3-A5531E510DB2}">
-      <thm15:themeFamily xmlns="" xmlns:thm15="http://schemas.microsoft.com/office/thememl/2012/main" name="Office Theme" id="{62F939B6-93AF-4DB8-9C6B-D6C7DFDC589F}" vid="{4A3C46E8-61CC-4603-A589-7422A47A8E4A}"/>
+      <thm15:themeFamily xmlns:thm15="http://schemas.microsoft.com/office/thememl/2012/main" xmlns="" name="Office Theme" id="{62F939B6-93AF-4DB8-9C6B-D6C7DFDC589F}" vid="{4A3C46E8-61CC-4603-A589-7422A47A8E4A}"/>
     </a:ext>
   </a:extLst>
 </a:theme>

</xml_diff>

<commit_message>
Add a slide before preprocessing step explaint what will be next
</commit_message>
<xml_diff>
--- a/Compilation.pptx
+++ b/Compilation.pptx
@@ -11,17 +11,18 @@
     <p:sldId id="272" r:id="rId5"/>
     <p:sldId id="271" r:id="rId6"/>
     <p:sldId id="258" r:id="rId7"/>
-    <p:sldId id="259" r:id="rId8"/>
-    <p:sldId id="260" r:id="rId9"/>
-    <p:sldId id="261" r:id="rId10"/>
-    <p:sldId id="262" r:id="rId11"/>
-    <p:sldId id="263" r:id="rId12"/>
-    <p:sldId id="264" r:id="rId13"/>
-    <p:sldId id="265" r:id="rId14"/>
-    <p:sldId id="267" r:id="rId15"/>
-    <p:sldId id="266" r:id="rId16"/>
-    <p:sldId id="268" r:id="rId17"/>
-    <p:sldId id="269" r:id="rId18"/>
+    <p:sldId id="273" r:id="rId8"/>
+    <p:sldId id="259" r:id="rId9"/>
+    <p:sldId id="260" r:id="rId10"/>
+    <p:sldId id="261" r:id="rId11"/>
+    <p:sldId id="262" r:id="rId12"/>
+    <p:sldId id="263" r:id="rId13"/>
+    <p:sldId id="264" r:id="rId14"/>
+    <p:sldId id="265" r:id="rId15"/>
+    <p:sldId id="267" r:id="rId16"/>
+    <p:sldId id="266" r:id="rId17"/>
+    <p:sldId id="268" r:id="rId18"/>
+    <p:sldId id="269" r:id="rId19"/>
   </p:sldIdLst>
   <p:sldSz cx="12192000" cy="6858000"/>
   <p:notesSz cx="6858000" cy="9144000"/>
@@ -122,7 +123,7 @@
   </p:defaultTextStyle>
   <p:extLst>
     <p:ext uri="{EFAFB233-063F-42B5-8137-9DF3F51BA10A}">
-      <p15:sldGuideLst xmlns:p15="http://schemas.microsoft.com/office/powerpoint/2012/main" xmlns=""/>
+      <p15:sldGuideLst xmlns="" xmlns:p15="http://schemas.microsoft.com/office/powerpoint/2012/main"/>
     </p:ext>
   </p:extLst>
 </p:presentation>
@@ -3082,12 +3083,83 @@
           <a:chExt cx="0" cy="0"/>
         </a:xfrm>
       </p:grpSpPr>
+      <p:pic>
+        <p:nvPicPr>
+          <p:cNvPr id="3074" name="Picture 2" descr="E:\project\youcode\compilation code examples\carbon (1).png"/>
+          <p:cNvPicPr>
+            <a:picLocks noChangeAspect="1" noChangeArrowheads="1"/>
+          </p:cNvPicPr>
+          <p:nvPr/>
+        </p:nvPicPr>
+        <p:blipFill>
+          <a:blip r:embed="rId2">
+            <a:extLst>
+              <a:ext uri="{28A0092B-C50C-407E-A947-70E740481C1C}">
+                <a14:useLocalDpi xmlns:a14="http://schemas.microsoft.com/office/drawing/2010/main" val="0"/>
+              </a:ext>
+            </a:extLst>
+          </a:blip>
+          <a:srcRect/>
+          <a:stretch>
+            <a:fillRect/>
+          </a:stretch>
+        </p:blipFill>
+        <p:spPr bwMode="auto">
+          <a:xfrm>
+            <a:off x="4053211" y="241623"/>
+            <a:ext cx="4035630" cy="6374755"/>
+          </a:xfrm>
+          <a:prstGeom prst="rect">
+            <a:avLst/>
+          </a:prstGeom>
+          <a:noFill/>
+          <a:extLst>
+            <a:ext uri="{909E8E84-426E-40DD-AFC4-6F175D3DCCD1}">
+              <a14:hiddenFill xmlns:a14="http://schemas.microsoft.com/office/drawing/2010/main">
+                <a:solidFill>
+                  <a:srgbClr val="FFFFFF"/>
+                </a:solidFill>
+              </a14:hiddenFill>
+            </a:ext>
+          </a:extLst>
+        </p:spPr>
+      </p:pic>
+    </p:spTree>
+    <p:extLst>
+      <p:ext uri="{BB962C8B-B14F-4D97-AF65-F5344CB8AC3E}">
+        <p14:creationId xmlns:p14="http://schemas.microsoft.com/office/powerpoint/2010/main" val="2941267069"/>
+      </p:ext>
+    </p:extLst>
+  </p:cSld>
+  <p:clrMapOvr>
+    <a:masterClrMapping/>
+  </p:clrMapOvr>
+</p:sld>
+</file>
+
+<file path=ppt/slides/slide11.xml><?xml version="1.0" encoding="utf-8"?>
+<p:sld xmlns:a="http://schemas.openxmlformats.org/drawingml/2006/main" xmlns:r="http://schemas.openxmlformats.org/officeDocument/2006/relationships" xmlns:p="http://schemas.openxmlformats.org/presentationml/2006/main">
+  <p:cSld>
+    <p:spTree>
+      <p:nvGrpSpPr>
+        <p:cNvPr id="1" name=""/>
+        <p:cNvGrpSpPr/>
+        <p:nvPr/>
+      </p:nvGrpSpPr>
+      <p:grpSpPr>
+        <a:xfrm>
+          <a:off x="0" y="0"/>
+          <a:ext cx="0" cy="0"/>
+          <a:chOff x="0" y="0"/>
+          <a:chExt cx="0" cy="0"/>
+        </a:xfrm>
+      </p:grpSpPr>
       <p:sp>
         <p:nvSpPr>
           <p:cNvPr id="8" name="ZoneTexte 7">
             <a:extLst>
               <a:ext uri="{FF2B5EF4-FFF2-40B4-BE49-F238E27FC236}">
-                <a16:creationId xmlns:a16="http://schemas.microsoft.com/office/drawing/2014/main" xmlns="" id="{0998BD72-6C6D-4B79-91C5-9F1AE3281044}"/>
+                <a16:creationId xmlns="" xmlns:a16="http://schemas.microsoft.com/office/drawing/2014/main" id="{0998BD72-6C6D-4B79-91C5-9F1AE3281044}"/>
               </a:ext>
             </a:extLst>
           </p:cNvPr>
@@ -3141,7 +3213,7 @@
 </p:sld>
 </file>
 
-<file path=ppt/slides/slide11.xml><?xml version="1.0" encoding="utf-8"?>
+<file path=ppt/slides/slide12.xml><?xml version="1.0" encoding="utf-8"?>
 <p:sld xmlns:a="http://schemas.openxmlformats.org/drawingml/2006/main" xmlns:r="http://schemas.openxmlformats.org/officeDocument/2006/relationships" xmlns:p="http://schemas.openxmlformats.org/presentationml/2006/main">
   <p:cSld>
     <p:spTree>
@@ -3177,7 +3249,7 @@
             <p:cNvPr id="4" name="ZoneTexte 7">
               <a:extLst>
                 <a:ext uri="{FF2B5EF4-FFF2-40B4-BE49-F238E27FC236}">
-                  <a16:creationId xmlns:a16="http://schemas.microsoft.com/office/drawing/2014/main" xmlns="" id="{0998BD72-6C6D-4B79-91C5-9F1AE3281044}"/>
+                  <a16:creationId xmlns="" xmlns:a16="http://schemas.microsoft.com/office/drawing/2014/main" id="{0998BD72-6C6D-4B79-91C5-9F1AE3281044}"/>
                 </a:ext>
               </a:extLst>
             </p:cNvPr>
@@ -3227,7 +3299,7 @@
             <p:cNvPr id="5" name="ZoneTexte 7">
               <a:extLst>
                 <a:ext uri="{FF2B5EF4-FFF2-40B4-BE49-F238E27FC236}">
-                  <a16:creationId xmlns:a16="http://schemas.microsoft.com/office/drawing/2014/main" xmlns="" id="{0998BD72-6C6D-4B79-91C5-9F1AE3281044}"/>
+                  <a16:creationId xmlns="" xmlns:a16="http://schemas.microsoft.com/office/drawing/2014/main" id="{0998BD72-6C6D-4B79-91C5-9F1AE3281044}"/>
                 </a:ext>
               </a:extLst>
             </p:cNvPr>
@@ -3302,7 +3374,7 @@
 </p:sld>
 </file>
 
-<file path=ppt/slides/slide12.xml><?xml version="1.0" encoding="utf-8"?>
+<file path=ppt/slides/slide13.xml><?xml version="1.0" encoding="utf-8"?>
 <p:sld xmlns:a="http://schemas.openxmlformats.org/drawingml/2006/main" xmlns:r="http://schemas.openxmlformats.org/officeDocument/2006/relationships" xmlns:p="http://schemas.openxmlformats.org/presentationml/2006/main">
   <p:cSld>
     <p:spTree>
@@ -3373,7 +3445,7 @@
 </p:sld>
 </file>
 
-<file path=ppt/slides/slide13.xml><?xml version="1.0" encoding="utf-8"?>
+<file path=ppt/slides/slide14.xml><?xml version="1.0" encoding="utf-8"?>
 <p:sld xmlns:a="http://schemas.openxmlformats.org/drawingml/2006/main" xmlns:r="http://schemas.openxmlformats.org/officeDocument/2006/relationships" xmlns:p="http://schemas.openxmlformats.org/presentationml/2006/main">
   <p:cSld>
     <p:spTree>
@@ -3444,7 +3516,7 @@
 </p:sld>
 </file>
 
-<file path=ppt/slides/slide14.xml><?xml version="1.0" encoding="utf-8"?>
+<file path=ppt/slides/slide15.xml><?xml version="1.0" encoding="utf-8"?>
 <p:sld xmlns:a="http://schemas.openxmlformats.org/drawingml/2006/main" xmlns:r="http://schemas.openxmlformats.org/officeDocument/2006/relationships" xmlns:p="http://schemas.openxmlformats.org/presentationml/2006/main">
   <p:cSld>
     <p:spTree>
@@ -3466,7 +3538,7 @@
           <p:cNvPr id="8" name="ZoneTexte 7">
             <a:extLst>
               <a:ext uri="{FF2B5EF4-FFF2-40B4-BE49-F238E27FC236}">
-                <a16:creationId xmlns:a16="http://schemas.microsoft.com/office/drawing/2014/main" xmlns="" id="{0998BD72-6C6D-4B79-91C5-9F1AE3281044}"/>
+                <a16:creationId xmlns="" xmlns:a16="http://schemas.microsoft.com/office/drawing/2014/main" id="{0998BD72-6C6D-4B79-91C5-9F1AE3281044}"/>
               </a:ext>
             </a:extLst>
           </p:cNvPr>
@@ -3520,7 +3592,7 @@
 </p:sld>
 </file>
 
-<file path=ppt/slides/slide15.xml><?xml version="1.0" encoding="utf-8"?>
+<file path=ppt/slides/slide16.xml><?xml version="1.0" encoding="utf-8"?>
 <p:sld xmlns:a="http://schemas.openxmlformats.org/drawingml/2006/main" xmlns:r="http://schemas.openxmlformats.org/officeDocument/2006/relationships" xmlns:p="http://schemas.openxmlformats.org/presentationml/2006/main">
   <p:cSld>
     <p:spTree>
@@ -3556,7 +3628,7 @@
             <p:cNvPr id="4" name="ZoneTexte 7">
               <a:extLst>
                 <a:ext uri="{FF2B5EF4-FFF2-40B4-BE49-F238E27FC236}">
-                  <a16:creationId xmlns:a16="http://schemas.microsoft.com/office/drawing/2014/main" xmlns="" id="{0998BD72-6C6D-4B79-91C5-9F1AE3281044}"/>
+                  <a16:creationId xmlns="" xmlns:a16="http://schemas.microsoft.com/office/drawing/2014/main" id="{0998BD72-6C6D-4B79-91C5-9F1AE3281044}"/>
                 </a:ext>
               </a:extLst>
             </p:cNvPr>
@@ -3606,7 +3678,7 @@
             <p:cNvPr id="5" name="ZoneTexte 7">
               <a:extLst>
                 <a:ext uri="{FF2B5EF4-FFF2-40B4-BE49-F238E27FC236}">
-                  <a16:creationId xmlns:a16="http://schemas.microsoft.com/office/drawing/2014/main" xmlns="" id="{0998BD72-6C6D-4B79-91C5-9F1AE3281044}"/>
+                  <a16:creationId xmlns="" xmlns:a16="http://schemas.microsoft.com/office/drawing/2014/main" id="{0998BD72-6C6D-4B79-91C5-9F1AE3281044}"/>
                 </a:ext>
               </a:extLst>
             </p:cNvPr>
@@ -3691,7 +3763,7 @@
 </p:sld>
 </file>
 
-<file path=ppt/slides/slide16.xml><?xml version="1.0" encoding="utf-8"?>
+<file path=ppt/slides/slide17.xml><?xml version="1.0" encoding="utf-8"?>
 <p:sld xmlns:a="http://schemas.openxmlformats.org/drawingml/2006/main" xmlns:r="http://schemas.openxmlformats.org/officeDocument/2006/relationships" xmlns:p="http://schemas.openxmlformats.org/presentationml/2006/main">
   <p:cSld>
     <p:spTree>
@@ -3713,7 +3785,7 @@
           <p:cNvPr id="8" name="ZoneTexte 7">
             <a:extLst>
               <a:ext uri="{FF2B5EF4-FFF2-40B4-BE49-F238E27FC236}">
-                <a16:creationId xmlns:a16="http://schemas.microsoft.com/office/drawing/2014/main" xmlns="" id="{0998BD72-6C6D-4B79-91C5-9F1AE3281044}"/>
+                <a16:creationId xmlns="" xmlns:a16="http://schemas.microsoft.com/office/drawing/2014/main" id="{0998BD72-6C6D-4B79-91C5-9F1AE3281044}"/>
               </a:ext>
             </a:extLst>
           </p:cNvPr>
@@ -3767,7 +3839,7 @@
 </p:sld>
 </file>
 
-<file path=ppt/slides/slide17.xml><?xml version="1.0" encoding="utf-8"?>
+<file path=ppt/slides/slide18.xml><?xml version="1.0" encoding="utf-8"?>
 <p:sld xmlns:a="http://schemas.openxmlformats.org/drawingml/2006/main" xmlns:r="http://schemas.openxmlformats.org/officeDocument/2006/relationships" xmlns:p="http://schemas.openxmlformats.org/presentationml/2006/main">
   <p:cSld>
     <p:spTree>
@@ -3803,7 +3875,7 @@
             <p:cNvPr id="4" name="ZoneTexte 7">
               <a:extLst>
                 <a:ext uri="{FF2B5EF4-FFF2-40B4-BE49-F238E27FC236}">
-                  <a16:creationId xmlns:a16="http://schemas.microsoft.com/office/drawing/2014/main" xmlns="" id="{0998BD72-6C6D-4B79-91C5-9F1AE3281044}"/>
+                  <a16:creationId xmlns="" xmlns:a16="http://schemas.microsoft.com/office/drawing/2014/main" id="{0998BD72-6C6D-4B79-91C5-9F1AE3281044}"/>
                 </a:ext>
               </a:extLst>
             </p:cNvPr>
@@ -3853,7 +3925,7 @@
             <p:cNvPr id="5" name="ZoneTexte 7">
               <a:extLst>
                 <a:ext uri="{FF2B5EF4-FFF2-40B4-BE49-F238E27FC236}">
-                  <a16:creationId xmlns:a16="http://schemas.microsoft.com/office/drawing/2014/main" xmlns="" id="{0998BD72-6C6D-4B79-91C5-9F1AE3281044}"/>
+                  <a16:creationId xmlns="" xmlns:a16="http://schemas.microsoft.com/office/drawing/2014/main" id="{0998BD72-6C6D-4B79-91C5-9F1AE3281044}"/>
                 </a:ext>
               </a:extLst>
             </p:cNvPr>
@@ -3960,7 +4032,7 @@
           <p:cNvPr id="8" name="ZoneTexte 7">
             <a:extLst>
               <a:ext uri="{FF2B5EF4-FFF2-40B4-BE49-F238E27FC236}">
-                <a16:creationId xmlns:a16="http://schemas.microsoft.com/office/drawing/2014/main" xmlns="" id="{0998BD72-6C6D-4B79-91C5-9F1AE3281044}"/>
+                <a16:creationId xmlns="" xmlns:a16="http://schemas.microsoft.com/office/drawing/2014/main" id="{0998BD72-6C6D-4B79-91C5-9F1AE3281044}"/>
               </a:ext>
             </a:extLst>
           </p:cNvPr>
@@ -4505,7 +4577,7 @@
           <p:cNvPr id="8" name="ZoneTexte 7">
             <a:extLst>
               <a:ext uri="{FF2B5EF4-FFF2-40B4-BE49-F238E27FC236}">
-                <a16:creationId xmlns:a16="http://schemas.microsoft.com/office/drawing/2014/main" xmlns="" id="{0998BD72-6C6D-4B79-91C5-9F1AE3281044}"/>
+                <a16:creationId xmlns="" xmlns:a16="http://schemas.microsoft.com/office/drawing/2014/main" id="{0998BD72-6C6D-4B79-91C5-9F1AE3281044}"/>
               </a:ext>
             </a:extLst>
           </p:cNvPr>
@@ -4839,46 +4911,88 @@
       </p:grpSpPr>
       <p:sp>
         <p:nvSpPr>
-          <p:cNvPr id="8" name="ZoneTexte 7">
-            <a:extLst>
-              <a:ext uri="{FF2B5EF4-FFF2-40B4-BE49-F238E27FC236}">
-                <a16:creationId xmlns:a16="http://schemas.microsoft.com/office/drawing/2014/main" xmlns="" id="{0998BD72-6C6D-4B79-91C5-9F1AE3281044}"/>
-              </a:ext>
-            </a:extLst>
-          </p:cNvPr>
-          <p:cNvSpPr txBox="1"/>
+          <p:cNvPr id="2" name="Rectangle 1"/>
+          <p:cNvSpPr/>
           <p:nvPr/>
         </p:nvSpPr>
         <p:spPr>
           <a:xfrm>
-            <a:off x="1225233" y="3076093"/>
-            <a:ext cx="9736236" cy="707886"/>
+            <a:off x="777433" y="2305616"/>
+            <a:ext cx="10637134" cy="2246769"/>
           </a:xfrm>
           <a:prstGeom prst="rect">
             <a:avLst/>
           </a:prstGeom>
-          <a:noFill/>
         </p:spPr>
         <p:txBody>
-          <a:bodyPr rot="0" spcFirstLastPara="0" vertOverflow="overflow" horzOverflow="overflow" vert="horz" wrap="square" lIns="91440" tIns="45720" rIns="91440" bIns="45720" numCol="1" spcCol="0" rtlCol="0" fromWordArt="0" anchor="t" anchorCtr="0" forceAA="0" compatLnSpc="1">
-            <a:prstTxWarp prst="textNoShape">
-              <a:avLst/>
-            </a:prstTxWarp>
+          <a:bodyPr wrap="square">
             <a:spAutoFit/>
           </a:bodyPr>
           <a:lstStyle/>
           <a:p>
-            <a:pPr algn="ctr"/>
-            <a:r>
-              <a:rPr lang="en-US" sz="4000" b="1" dirty="0">
+            <a:pPr marL="285750" indent="-285750">
+              <a:buFont typeface="Arial"/>
+              <a:buChar char="•"/>
+            </a:pPr>
+            <a:r>
+              <a:rPr lang="en-US" sz="2800" dirty="0">
+                <a:cs typeface="Calibri"/>
+              </a:rPr>
+              <a:t>The 4 different steps of compilation ( GCC ): </a:t>
+            </a:r>
+          </a:p>
+          <a:p>
+            <a:pPr marL="742950" lvl="1" indent="-285750">
+              <a:buFont typeface="Arial,Sans-Serif"/>
+              <a:buChar char="•"/>
+            </a:pPr>
+            <a:r>
+              <a:rPr lang="en-US" sz="2800" dirty="0">
                 <a:ea typeface="+mn-lt"/>
                 <a:cs typeface="+mn-lt"/>
               </a:rPr>
               <a:t>The preprocessing</a:t>
             </a:r>
-            <a:endParaRPr lang="en-US" sz="4000" b="1" dirty="0">
-              <a:cs typeface="Calibri"/>
-            </a:endParaRPr>
+          </a:p>
+          <a:p>
+            <a:pPr marL="742950" lvl="1" indent="-285750">
+              <a:buFont typeface="Arial,Sans-Serif"/>
+              <a:buChar char="•"/>
+            </a:pPr>
+            <a:r>
+              <a:rPr lang="en-US" sz="2800" dirty="0">
+                <a:ea typeface="+mn-lt"/>
+                <a:cs typeface="+mn-lt"/>
+              </a:rPr>
+              <a:t>The compiling</a:t>
+            </a:r>
+          </a:p>
+          <a:p>
+            <a:pPr marL="742950" lvl="1" indent="-285750">
+              <a:buFont typeface="Arial,Sans-Serif"/>
+              <a:buChar char="•"/>
+            </a:pPr>
+            <a:r>
+              <a:rPr lang="en-US" sz="2800" dirty="0">
+                <a:ea typeface="+mn-lt"/>
+                <a:cs typeface="+mn-lt"/>
+              </a:rPr>
+              <a:t>The assembling</a:t>
+            </a:r>
+          </a:p>
+          <a:p>
+            <a:pPr marL="742950" lvl="1" indent="-285750">
+              <a:buFont typeface="Arial,Sans-Serif"/>
+              <a:buChar char="•"/>
+            </a:pPr>
+            <a:r>
+              <a:rPr lang="en-US" sz="2800" dirty="0">
+                <a:ea typeface="+mn-lt"/>
+                <a:cs typeface="+mn-lt"/>
+              </a:rPr>
+              <a:t>The linking</a:t>
+            </a:r>
+            <a:endParaRPr lang="en-US" sz="2800" dirty="0"/>
           </a:p>
         </p:txBody>
       </p:sp>
@@ -4919,6 +5033,88 @@
           <a:chExt cx="0" cy="0"/>
         </a:xfrm>
       </p:grpSpPr>
+      <p:sp>
+        <p:nvSpPr>
+          <p:cNvPr id="8" name="ZoneTexte 7">
+            <a:extLst>
+              <a:ext uri="{FF2B5EF4-FFF2-40B4-BE49-F238E27FC236}">
+                <a16:creationId xmlns="" xmlns:a16="http://schemas.microsoft.com/office/drawing/2014/main" id="{0998BD72-6C6D-4B79-91C5-9F1AE3281044}"/>
+              </a:ext>
+            </a:extLst>
+          </p:cNvPr>
+          <p:cNvSpPr txBox="1"/>
+          <p:nvPr/>
+        </p:nvSpPr>
+        <p:spPr>
+          <a:xfrm>
+            <a:off x="1225233" y="3076093"/>
+            <a:ext cx="9736236" cy="707886"/>
+          </a:xfrm>
+          <a:prstGeom prst="rect">
+            <a:avLst/>
+          </a:prstGeom>
+          <a:noFill/>
+        </p:spPr>
+        <p:txBody>
+          <a:bodyPr rot="0" spcFirstLastPara="0" vertOverflow="overflow" horzOverflow="overflow" vert="horz" wrap="square" lIns="91440" tIns="45720" rIns="91440" bIns="45720" numCol="1" spcCol="0" rtlCol="0" fromWordArt="0" anchor="t" anchorCtr="0" forceAA="0" compatLnSpc="1">
+            <a:prstTxWarp prst="textNoShape">
+              <a:avLst/>
+            </a:prstTxWarp>
+            <a:spAutoFit/>
+          </a:bodyPr>
+          <a:lstStyle/>
+          <a:p>
+            <a:pPr algn="ctr"/>
+            <a:r>
+              <a:rPr lang="en-US" sz="4000" b="1" dirty="0">
+                <a:ea typeface="+mn-lt"/>
+                <a:cs typeface="+mn-lt"/>
+              </a:rPr>
+              <a:t>The preprocessing</a:t>
+            </a:r>
+            <a:endParaRPr lang="en-US" sz="4000" b="1" dirty="0">
+              <a:cs typeface="Calibri"/>
+            </a:endParaRPr>
+          </a:p>
+        </p:txBody>
+      </p:sp>
+    </p:spTree>
+    <p:extLst>
+      <p:ext uri="{BB962C8B-B14F-4D97-AF65-F5344CB8AC3E}">
+        <p14:creationId xmlns:p14="http://schemas.microsoft.com/office/powerpoint/2010/main" val="4125327672"/>
+      </p:ext>
+    </p:extLst>
+  </p:cSld>
+  <p:clrMapOvr>
+    <a:masterClrMapping/>
+  </p:clrMapOvr>
+  <p:timing>
+    <p:tnLst>
+      <p:par>
+        <p:cTn id="1" dur="indefinite" restart="never" nodeType="tmRoot"/>
+      </p:par>
+    </p:tnLst>
+  </p:timing>
+</p:sld>
+</file>
+
+<file path=ppt/slides/slide8.xml><?xml version="1.0" encoding="utf-8"?>
+<p:sld xmlns:a="http://schemas.openxmlformats.org/drawingml/2006/main" xmlns:r="http://schemas.openxmlformats.org/officeDocument/2006/relationships" xmlns:p="http://schemas.openxmlformats.org/presentationml/2006/main">
+  <p:cSld>
+    <p:spTree>
+      <p:nvGrpSpPr>
+        <p:cNvPr id="1" name=""/>
+        <p:cNvGrpSpPr/>
+        <p:nvPr/>
+      </p:nvGrpSpPr>
+      <p:grpSpPr>
+        <a:xfrm>
+          <a:off x="0" y="0"/>
+          <a:ext cx="0" cy="0"/>
+          <a:chOff x="0" y="0"/>
+          <a:chExt cx="0" cy="0"/>
+        </a:xfrm>
+      </p:grpSpPr>
       <p:grpSp>
         <p:nvGrpSpPr>
           <p:cNvPr id="2" name="Group 1"/>
@@ -4938,7 +5134,7 @@
             <p:cNvPr id="8" name="ZoneTexte 7">
               <a:extLst>
                 <a:ext uri="{FF2B5EF4-FFF2-40B4-BE49-F238E27FC236}">
-                  <a16:creationId xmlns:a16="http://schemas.microsoft.com/office/drawing/2014/main" xmlns="" id="{0998BD72-6C6D-4B79-91C5-9F1AE3281044}"/>
+                  <a16:creationId xmlns="" xmlns:a16="http://schemas.microsoft.com/office/drawing/2014/main" id="{0998BD72-6C6D-4B79-91C5-9F1AE3281044}"/>
                 </a:ext>
               </a:extLst>
             </p:cNvPr>
@@ -5007,7 +5203,7 @@
             <p:cNvPr id="4" name="ZoneTexte 7">
               <a:extLst>
                 <a:ext uri="{FF2B5EF4-FFF2-40B4-BE49-F238E27FC236}">
-                  <a16:creationId xmlns:a16="http://schemas.microsoft.com/office/drawing/2014/main" xmlns="" id="{0998BD72-6C6D-4B79-91C5-9F1AE3281044}"/>
+                  <a16:creationId xmlns="" xmlns:a16="http://schemas.microsoft.com/office/drawing/2014/main" id="{0998BD72-6C6D-4B79-91C5-9F1AE3281044}"/>
                 </a:ext>
               </a:extLst>
             </p:cNvPr>
@@ -5089,7 +5285,7 @@
 </p:sld>
 </file>
 
-<file path=ppt/slides/slide8.xml><?xml version="1.0" encoding="utf-8"?>
+<file path=ppt/slides/slide9.xml><?xml version="1.0" encoding="utf-8"?>
 <p:sld xmlns:a="http://schemas.openxmlformats.org/drawingml/2006/main" xmlns:r="http://schemas.openxmlformats.org/officeDocument/2006/relationships" xmlns:p="http://schemas.openxmlformats.org/presentationml/2006/main">
   <p:cSld>
     <p:spTree>
@@ -5157,77 +5353,13 @@
   <p:clrMapOvr>
     <a:masterClrMapping/>
   </p:clrMapOvr>
-</p:sld>
-</file>
-
-<file path=ppt/slides/slide9.xml><?xml version="1.0" encoding="utf-8"?>
-<p:sld xmlns:a="http://schemas.openxmlformats.org/drawingml/2006/main" xmlns:r="http://schemas.openxmlformats.org/officeDocument/2006/relationships" xmlns:p="http://schemas.openxmlformats.org/presentationml/2006/main">
-  <p:cSld>
-    <p:spTree>
-      <p:nvGrpSpPr>
-        <p:cNvPr id="1" name=""/>
-        <p:cNvGrpSpPr/>
-        <p:nvPr/>
-      </p:nvGrpSpPr>
-      <p:grpSpPr>
-        <a:xfrm>
-          <a:off x="0" y="0"/>
-          <a:ext cx="0" cy="0"/>
-          <a:chOff x="0" y="0"/>
-          <a:chExt cx="0" cy="0"/>
-        </a:xfrm>
-      </p:grpSpPr>
-      <p:pic>
-        <p:nvPicPr>
-          <p:cNvPr id="3074" name="Picture 2" descr="E:\project\youcode\compilation code examples\carbon (1).png"/>
-          <p:cNvPicPr>
-            <a:picLocks noChangeAspect="1" noChangeArrowheads="1"/>
-          </p:cNvPicPr>
-          <p:nvPr/>
-        </p:nvPicPr>
-        <p:blipFill>
-          <a:blip r:embed="rId2">
-            <a:extLst>
-              <a:ext uri="{28A0092B-C50C-407E-A947-70E740481C1C}">
-                <a14:useLocalDpi xmlns:a14="http://schemas.microsoft.com/office/drawing/2010/main" val="0"/>
-              </a:ext>
-            </a:extLst>
-          </a:blip>
-          <a:srcRect/>
-          <a:stretch>
-            <a:fillRect/>
-          </a:stretch>
-        </p:blipFill>
-        <p:spPr bwMode="auto">
-          <a:xfrm>
-            <a:off x="4053211" y="241623"/>
-            <a:ext cx="4035630" cy="6374755"/>
-          </a:xfrm>
-          <a:prstGeom prst="rect">
-            <a:avLst/>
-          </a:prstGeom>
-          <a:noFill/>
-          <a:extLst>
-            <a:ext uri="{909E8E84-426E-40DD-AFC4-6F175D3DCCD1}">
-              <a14:hiddenFill xmlns:a14="http://schemas.microsoft.com/office/drawing/2010/main">
-                <a:solidFill>
-                  <a:srgbClr val="FFFFFF"/>
-                </a:solidFill>
-              </a14:hiddenFill>
-            </a:ext>
-          </a:extLst>
-        </p:spPr>
-      </p:pic>
-    </p:spTree>
-    <p:extLst>
-      <p:ext uri="{BB962C8B-B14F-4D97-AF65-F5344CB8AC3E}">
-        <p14:creationId xmlns:p14="http://schemas.microsoft.com/office/powerpoint/2010/main" val="2941267069"/>
-      </p:ext>
-    </p:extLst>
-  </p:cSld>
-  <p:clrMapOvr>
-    <a:masterClrMapping/>
-  </p:clrMapOvr>
+  <p:timing>
+    <p:tnLst>
+      <p:par>
+        <p:cTn id="1" dur="indefinite" restart="never" nodeType="tmRoot"/>
+      </p:par>
+    </p:tnLst>
+  </p:timing>
 </p:sld>
 </file>
 
@@ -5486,7 +5618,7 @@
   <a:extraClrSchemeLst/>
   <a:extLst>
     <a:ext uri="{05A4C25C-085E-4340-85A3-A5531E510DB2}">
-      <thm15:themeFamily xmlns:thm15="http://schemas.microsoft.com/office/thememl/2012/main" xmlns="" name="Office Theme" id="{62F939B6-93AF-4DB8-9C6B-D6C7DFDC589F}" vid="{4A3C46E8-61CC-4603-A589-7422A47A8E4A}"/>
+      <thm15:themeFamily xmlns="" xmlns:thm15="http://schemas.microsoft.com/office/thememl/2012/main" name="Office Theme" id="{62F939B6-93AF-4DB8-9C6B-D6C7DFDC589F}" vid="{4A3C46E8-61CC-4603-A589-7422A47A8E4A}"/>
     </a:ext>
   </a:extLst>
 </a:theme>

</xml_diff>

<commit_message>
forget what i did
</commit_message>
<xml_diff>
--- a/Compilation.pptx
+++ b/Compilation.pptx
@@ -123,7 +123,7 @@
   </p:defaultTextStyle>
   <p:extLst>
     <p:ext uri="{EFAFB233-063F-42B5-8137-9DF3F51BA10A}">
-      <p15:sldGuideLst xmlns="" xmlns:p15="http://schemas.microsoft.com/office/powerpoint/2012/main"/>
+      <p15:sldGuideLst xmlns:p15="http://schemas.microsoft.com/office/powerpoint/2012/main" xmlns=""/>
     </p:ext>
   </p:extLst>
 </p:presentation>
@@ -3134,6 +3134,13 @@
   <p:clrMapOvr>
     <a:masterClrMapping/>
   </p:clrMapOvr>
+  <p:timing>
+    <p:tnLst>
+      <p:par>
+        <p:cTn id="1" dur="indefinite" restart="never" nodeType="tmRoot"/>
+      </p:par>
+    </p:tnLst>
+  </p:timing>
 </p:sld>
 </file>
 
@@ -3159,7 +3166,7 @@
           <p:cNvPr id="8" name="ZoneTexte 7">
             <a:extLst>
               <a:ext uri="{FF2B5EF4-FFF2-40B4-BE49-F238E27FC236}">
-                <a16:creationId xmlns="" xmlns:a16="http://schemas.microsoft.com/office/drawing/2014/main" id="{0998BD72-6C6D-4B79-91C5-9F1AE3281044}"/>
+                <a16:creationId xmlns:a16="http://schemas.microsoft.com/office/drawing/2014/main" xmlns="" id="{0998BD72-6C6D-4B79-91C5-9F1AE3281044}"/>
               </a:ext>
             </a:extLst>
           </p:cNvPr>
@@ -3210,6 +3217,13 @@
   <p:clrMapOvr>
     <a:masterClrMapping/>
   </p:clrMapOvr>
+  <p:timing>
+    <p:tnLst>
+      <p:par>
+        <p:cTn id="1" dur="indefinite" restart="never" nodeType="tmRoot"/>
+      </p:par>
+    </p:tnLst>
+  </p:timing>
 </p:sld>
 </file>
 
@@ -3249,7 +3263,7 @@
             <p:cNvPr id="4" name="ZoneTexte 7">
               <a:extLst>
                 <a:ext uri="{FF2B5EF4-FFF2-40B4-BE49-F238E27FC236}">
-                  <a16:creationId xmlns="" xmlns:a16="http://schemas.microsoft.com/office/drawing/2014/main" id="{0998BD72-6C6D-4B79-91C5-9F1AE3281044}"/>
+                  <a16:creationId xmlns:a16="http://schemas.microsoft.com/office/drawing/2014/main" xmlns="" id="{0998BD72-6C6D-4B79-91C5-9F1AE3281044}"/>
                 </a:ext>
               </a:extLst>
             </p:cNvPr>
@@ -3299,7 +3313,7 @@
             <p:cNvPr id="5" name="ZoneTexte 7">
               <a:extLst>
                 <a:ext uri="{FF2B5EF4-FFF2-40B4-BE49-F238E27FC236}">
-                  <a16:creationId xmlns="" xmlns:a16="http://schemas.microsoft.com/office/drawing/2014/main" id="{0998BD72-6C6D-4B79-91C5-9F1AE3281044}"/>
+                  <a16:creationId xmlns:a16="http://schemas.microsoft.com/office/drawing/2014/main" xmlns="" id="{0998BD72-6C6D-4B79-91C5-9F1AE3281044}"/>
                 </a:ext>
               </a:extLst>
             </p:cNvPr>
@@ -3371,6 +3385,13 @@
   <p:clrMapOvr>
     <a:masterClrMapping/>
   </p:clrMapOvr>
+  <p:timing>
+    <p:tnLst>
+      <p:par>
+        <p:cTn id="1" dur="indefinite" restart="never" nodeType="tmRoot"/>
+      </p:par>
+    </p:tnLst>
+  </p:timing>
 </p:sld>
 </file>
 
@@ -3442,6 +3463,13 @@
   <p:clrMapOvr>
     <a:masterClrMapping/>
   </p:clrMapOvr>
+  <p:timing>
+    <p:tnLst>
+      <p:par>
+        <p:cTn id="1" dur="indefinite" restart="never" nodeType="tmRoot"/>
+      </p:par>
+    </p:tnLst>
+  </p:timing>
 </p:sld>
 </file>
 
@@ -3471,7 +3499,7 @@
           <p:nvPr/>
         </p:nvPicPr>
         <p:blipFill>
-          <a:blip r:embed="rId2">
+          <a:blip r:embed="rId2" cstate="print">
             <a:extLst>
               <a:ext uri="{28A0092B-C50C-407E-A947-70E740481C1C}">
                 <a14:useLocalDpi xmlns:a14="http://schemas.microsoft.com/office/drawing/2010/main" val="0"/>
@@ -3485,8 +3513,8 @@
         </p:blipFill>
         <p:spPr bwMode="auto">
           <a:xfrm>
-            <a:off x="3679002" y="-1465100"/>
-            <a:ext cx="4833997" cy="9788201"/>
+            <a:off x="4246164" y="-51476"/>
+            <a:ext cx="3437733" cy="6960952"/>
           </a:xfrm>
           <a:prstGeom prst="rect">
             <a:avLst/>
@@ -3513,6 +3541,13 @@
   <p:clrMapOvr>
     <a:masterClrMapping/>
   </p:clrMapOvr>
+  <p:timing>
+    <p:tnLst>
+      <p:par>
+        <p:cTn id="1" dur="indefinite" restart="never" nodeType="tmRoot"/>
+      </p:par>
+    </p:tnLst>
+  </p:timing>
 </p:sld>
 </file>
 
@@ -3538,7 +3573,7 @@
           <p:cNvPr id="8" name="ZoneTexte 7">
             <a:extLst>
               <a:ext uri="{FF2B5EF4-FFF2-40B4-BE49-F238E27FC236}">
-                <a16:creationId xmlns="" xmlns:a16="http://schemas.microsoft.com/office/drawing/2014/main" id="{0998BD72-6C6D-4B79-91C5-9F1AE3281044}"/>
+                <a16:creationId xmlns:a16="http://schemas.microsoft.com/office/drawing/2014/main" xmlns="" id="{0998BD72-6C6D-4B79-91C5-9F1AE3281044}"/>
               </a:ext>
             </a:extLst>
           </p:cNvPr>
@@ -3589,6 +3624,13 @@
   <p:clrMapOvr>
     <a:masterClrMapping/>
   </p:clrMapOvr>
+  <p:timing>
+    <p:tnLst>
+      <p:par>
+        <p:cTn id="1" dur="indefinite" restart="never" nodeType="tmRoot"/>
+      </p:par>
+    </p:tnLst>
+  </p:timing>
 </p:sld>
 </file>
 
@@ -3628,7 +3670,7 @@
             <p:cNvPr id="4" name="ZoneTexte 7">
               <a:extLst>
                 <a:ext uri="{FF2B5EF4-FFF2-40B4-BE49-F238E27FC236}">
-                  <a16:creationId xmlns="" xmlns:a16="http://schemas.microsoft.com/office/drawing/2014/main" id="{0998BD72-6C6D-4B79-91C5-9F1AE3281044}"/>
+                  <a16:creationId xmlns:a16="http://schemas.microsoft.com/office/drawing/2014/main" xmlns="" id="{0998BD72-6C6D-4B79-91C5-9F1AE3281044}"/>
                 </a:ext>
               </a:extLst>
             </p:cNvPr>
@@ -3678,7 +3720,7 @@
             <p:cNvPr id="5" name="ZoneTexte 7">
               <a:extLst>
                 <a:ext uri="{FF2B5EF4-FFF2-40B4-BE49-F238E27FC236}">
-                  <a16:creationId xmlns="" xmlns:a16="http://schemas.microsoft.com/office/drawing/2014/main" id="{0998BD72-6C6D-4B79-91C5-9F1AE3281044}"/>
+                  <a16:creationId xmlns:a16="http://schemas.microsoft.com/office/drawing/2014/main" xmlns="" id="{0998BD72-6C6D-4B79-91C5-9F1AE3281044}"/>
                 </a:ext>
               </a:extLst>
             </p:cNvPr>
@@ -3760,6 +3802,13 @@
   <p:clrMapOvr>
     <a:masterClrMapping/>
   </p:clrMapOvr>
+  <p:timing>
+    <p:tnLst>
+      <p:par>
+        <p:cTn id="1" dur="indefinite" restart="never" nodeType="tmRoot"/>
+      </p:par>
+    </p:tnLst>
+  </p:timing>
 </p:sld>
 </file>
 
@@ -3785,7 +3834,7 @@
           <p:cNvPr id="8" name="ZoneTexte 7">
             <a:extLst>
               <a:ext uri="{FF2B5EF4-FFF2-40B4-BE49-F238E27FC236}">
-                <a16:creationId xmlns="" xmlns:a16="http://schemas.microsoft.com/office/drawing/2014/main" id="{0998BD72-6C6D-4B79-91C5-9F1AE3281044}"/>
+                <a16:creationId xmlns:a16="http://schemas.microsoft.com/office/drawing/2014/main" xmlns="" id="{0998BD72-6C6D-4B79-91C5-9F1AE3281044}"/>
               </a:ext>
             </a:extLst>
           </p:cNvPr>
@@ -3836,6 +3885,13 @@
   <p:clrMapOvr>
     <a:masterClrMapping/>
   </p:clrMapOvr>
+  <p:timing>
+    <p:tnLst>
+      <p:par>
+        <p:cTn id="1" dur="indefinite" restart="never" nodeType="tmRoot"/>
+      </p:par>
+    </p:tnLst>
+  </p:timing>
 </p:sld>
 </file>
 
@@ -3875,7 +3931,7 @@
             <p:cNvPr id="4" name="ZoneTexte 7">
               <a:extLst>
                 <a:ext uri="{FF2B5EF4-FFF2-40B4-BE49-F238E27FC236}">
-                  <a16:creationId xmlns="" xmlns:a16="http://schemas.microsoft.com/office/drawing/2014/main" id="{0998BD72-6C6D-4B79-91C5-9F1AE3281044}"/>
+                  <a16:creationId xmlns:a16="http://schemas.microsoft.com/office/drawing/2014/main" xmlns="" id="{0998BD72-6C6D-4B79-91C5-9F1AE3281044}"/>
                 </a:ext>
               </a:extLst>
             </p:cNvPr>
@@ -3925,7 +3981,7 @@
             <p:cNvPr id="5" name="ZoneTexte 7">
               <a:extLst>
                 <a:ext uri="{FF2B5EF4-FFF2-40B4-BE49-F238E27FC236}">
-                  <a16:creationId xmlns="" xmlns:a16="http://schemas.microsoft.com/office/drawing/2014/main" id="{0998BD72-6C6D-4B79-91C5-9F1AE3281044}"/>
+                  <a16:creationId xmlns:a16="http://schemas.microsoft.com/office/drawing/2014/main" xmlns="" id="{0998BD72-6C6D-4B79-91C5-9F1AE3281044}"/>
                 </a:ext>
               </a:extLst>
             </p:cNvPr>
@@ -4007,6 +4063,13 @@
   <p:clrMapOvr>
     <a:masterClrMapping/>
   </p:clrMapOvr>
+  <p:timing>
+    <p:tnLst>
+      <p:par>
+        <p:cTn id="1" dur="indefinite" restart="never" nodeType="tmRoot"/>
+      </p:par>
+    </p:tnLst>
+  </p:timing>
 </p:sld>
 </file>
 
@@ -4032,7 +4095,7 @@
           <p:cNvPr id="8" name="ZoneTexte 7">
             <a:extLst>
               <a:ext uri="{FF2B5EF4-FFF2-40B4-BE49-F238E27FC236}">
-                <a16:creationId xmlns="" xmlns:a16="http://schemas.microsoft.com/office/drawing/2014/main" id="{0998BD72-6C6D-4B79-91C5-9F1AE3281044}"/>
+                <a16:creationId xmlns:a16="http://schemas.microsoft.com/office/drawing/2014/main" xmlns="" id="{0998BD72-6C6D-4B79-91C5-9F1AE3281044}"/>
               </a:ext>
             </a:extLst>
           </p:cNvPr>
@@ -4577,7 +4640,7 @@
           <p:cNvPr id="8" name="ZoneTexte 7">
             <a:extLst>
               <a:ext uri="{FF2B5EF4-FFF2-40B4-BE49-F238E27FC236}">
-                <a16:creationId xmlns="" xmlns:a16="http://schemas.microsoft.com/office/drawing/2014/main" id="{0998BD72-6C6D-4B79-91C5-9F1AE3281044}"/>
+                <a16:creationId xmlns:a16="http://schemas.microsoft.com/office/drawing/2014/main" xmlns="" id="{0998BD72-6C6D-4B79-91C5-9F1AE3281044}"/>
               </a:ext>
             </a:extLst>
           </p:cNvPr>
@@ -5038,7 +5101,7 @@
           <p:cNvPr id="8" name="ZoneTexte 7">
             <a:extLst>
               <a:ext uri="{FF2B5EF4-FFF2-40B4-BE49-F238E27FC236}">
-                <a16:creationId xmlns="" xmlns:a16="http://schemas.microsoft.com/office/drawing/2014/main" id="{0998BD72-6C6D-4B79-91C5-9F1AE3281044}"/>
+                <a16:creationId xmlns:a16="http://schemas.microsoft.com/office/drawing/2014/main" xmlns="" id="{0998BD72-6C6D-4B79-91C5-9F1AE3281044}"/>
               </a:ext>
             </a:extLst>
           </p:cNvPr>
@@ -5134,7 +5197,7 @@
             <p:cNvPr id="8" name="ZoneTexte 7">
               <a:extLst>
                 <a:ext uri="{FF2B5EF4-FFF2-40B4-BE49-F238E27FC236}">
-                  <a16:creationId xmlns="" xmlns:a16="http://schemas.microsoft.com/office/drawing/2014/main" id="{0998BD72-6C6D-4B79-91C5-9F1AE3281044}"/>
+                  <a16:creationId xmlns:a16="http://schemas.microsoft.com/office/drawing/2014/main" xmlns="" id="{0998BD72-6C6D-4B79-91C5-9F1AE3281044}"/>
                 </a:ext>
               </a:extLst>
             </p:cNvPr>
@@ -5203,7 +5266,7 @@
             <p:cNvPr id="4" name="ZoneTexte 7">
               <a:extLst>
                 <a:ext uri="{FF2B5EF4-FFF2-40B4-BE49-F238E27FC236}">
-                  <a16:creationId xmlns="" xmlns:a16="http://schemas.microsoft.com/office/drawing/2014/main" id="{0998BD72-6C6D-4B79-91C5-9F1AE3281044}"/>
+                  <a16:creationId xmlns:a16="http://schemas.microsoft.com/office/drawing/2014/main" xmlns="" id="{0998BD72-6C6D-4B79-91C5-9F1AE3281044}"/>
                 </a:ext>
               </a:extLst>
             </p:cNvPr>
@@ -5618,7 +5681,7 @@
   <a:extraClrSchemeLst/>
   <a:extLst>
     <a:ext uri="{05A4C25C-085E-4340-85A3-A5531E510DB2}">
-      <thm15:themeFamily xmlns="" xmlns:thm15="http://schemas.microsoft.com/office/thememl/2012/main" name="Office Theme" id="{62F939B6-93AF-4DB8-9C6B-D6C7DFDC589F}" vid="{4A3C46E8-61CC-4603-A589-7422A47A8E4A}"/>
+      <thm15:themeFamily xmlns:thm15="http://schemas.microsoft.com/office/thememl/2012/main" xmlns="" name="Office Theme" id="{62F939B6-93AF-4DB8-9C6B-D6C7DFDC589F}" vid="{4A3C46E8-61CC-4603-A589-7422A47A8E4A}"/>
     </a:ext>
   </a:extLst>
 </a:theme>

</xml_diff>